<commit_message>
add the k8s and cloud information
</commit_message>
<xml_diff>
--- a/chatbot-backend/team 8 AI Mavericks_v2_20230813.pptx
+++ b/chatbot-backend/team 8 AI Mavericks_v2_20230813.pptx
@@ -5,7 +5,7 @@
     <p:sldMasterId id="2147483648" r:id="rId1"/>
   </p:sldMasterIdLst>
   <p:notesMasterIdLst>
-    <p:notesMasterId r:id="rId18"/>
+    <p:notesMasterId r:id="rId21"/>
   </p:notesMasterIdLst>
   <p:sldIdLst>
     <p:sldId id="256" r:id="rId2"/>
@@ -22,8 +22,11 @@
     <p:sldId id="269" r:id="rId13"/>
     <p:sldId id="264" r:id="rId14"/>
     <p:sldId id="266" r:id="rId15"/>
-    <p:sldId id="265" r:id="rId16"/>
-    <p:sldId id="268" r:id="rId17"/>
+    <p:sldId id="277" r:id="rId16"/>
+    <p:sldId id="275" r:id="rId17"/>
+    <p:sldId id="276" r:id="rId18"/>
+    <p:sldId id="265" r:id="rId19"/>
+    <p:sldId id="268" r:id="rId20"/>
   </p:sldIdLst>
   <p:sldSz cx="12192000" cy="6858000"/>
   <p:notesSz cx="6858000" cy="9144000"/>
@@ -212,7 +215,7 @@
           <a:p>
             <a:fld id="{271D1A08-E460-3046-8A7B-ED9CECCC3A03}" type="datetimeFigureOut">
               <a:rPr lang="en-US" smtClean="0"/>
-              <a:t>2023-08-13</a:t>
+              <a:t>8/16/23</a:t>
             </a:fld>
             <a:endParaRPr lang="en-US"/>
           </a:p>
@@ -794,7 +797,7 @@
           <a:p>
             <a:fld id="{91ACB9E3-B631-DE47-A018-DC9FDDBF5249}" type="datetimeFigureOut">
               <a:rPr lang="en-US" smtClean="0"/>
-              <a:t>2023-08-13</a:t>
+              <a:t>8/16/23</a:t>
             </a:fld>
             <a:endParaRPr lang="en-US"/>
           </a:p>
@@ -992,7 +995,7 @@
           <a:p>
             <a:fld id="{91ACB9E3-B631-DE47-A018-DC9FDDBF5249}" type="datetimeFigureOut">
               <a:rPr lang="en-US" smtClean="0"/>
-              <a:t>2023-08-13</a:t>
+              <a:t>8/16/23</a:t>
             </a:fld>
             <a:endParaRPr lang="en-US"/>
           </a:p>
@@ -1200,7 +1203,7 @@
           <a:p>
             <a:fld id="{91ACB9E3-B631-DE47-A018-DC9FDDBF5249}" type="datetimeFigureOut">
               <a:rPr lang="en-US" smtClean="0"/>
-              <a:t>2023-08-13</a:t>
+              <a:t>8/16/23</a:t>
             </a:fld>
             <a:endParaRPr lang="en-US"/>
           </a:p>
@@ -1398,7 +1401,7 @@
           <a:p>
             <a:fld id="{91ACB9E3-B631-DE47-A018-DC9FDDBF5249}" type="datetimeFigureOut">
               <a:rPr lang="en-US" smtClean="0"/>
-              <a:t>2023-08-13</a:t>
+              <a:t>8/16/23</a:t>
             </a:fld>
             <a:endParaRPr lang="en-US"/>
           </a:p>
@@ -1673,7 +1676,7 @@
           <a:p>
             <a:fld id="{91ACB9E3-B631-DE47-A018-DC9FDDBF5249}" type="datetimeFigureOut">
               <a:rPr lang="en-US" smtClean="0"/>
-              <a:t>2023-08-13</a:t>
+              <a:t>8/16/23</a:t>
             </a:fld>
             <a:endParaRPr lang="en-US"/>
           </a:p>
@@ -1938,7 +1941,7 @@
           <a:p>
             <a:fld id="{91ACB9E3-B631-DE47-A018-DC9FDDBF5249}" type="datetimeFigureOut">
               <a:rPr lang="en-US" smtClean="0"/>
-              <a:t>2023-08-13</a:t>
+              <a:t>8/16/23</a:t>
             </a:fld>
             <a:endParaRPr lang="en-US"/>
           </a:p>
@@ -2350,7 +2353,7 @@
           <a:p>
             <a:fld id="{91ACB9E3-B631-DE47-A018-DC9FDDBF5249}" type="datetimeFigureOut">
               <a:rPr lang="en-US" smtClean="0"/>
-              <a:t>2023-08-13</a:t>
+              <a:t>8/16/23</a:t>
             </a:fld>
             <a:endParaRPr lang="en-US"/>
           </a:p>
@@ -2491,7 +2494,7 @@
           <a:p>
             <a:fld id="{91ACB9E3-B631-DE47-A018-DC9FDDBF5249}" type="datetimeFigureOut">
               <a:rPr lang="en-US" smtClean="0"/>
-              <a:t>2023-08-13</a:t>
+              <a:t>8/16/23</a:t>
             </a:fld>
             <a:endParaRPr lang="en-US"/>
           </a:p>
@@ -2604,7 +2607,7 @@
           <a:p>
             <a:fld id="{91ACB9E3-B631-DE47-A018-DC9FDDBF5249}" type="datetimeFigureOut">
               <a:rPr lang="en-US" smtClean="0"/>
-              <a:t>2023-08-13</a:t>
+              <a:t>8/16/23</a:t>
             </a:fld>
             <a:endParaRPr lang="en-US"/>
           </a:p>
@@ -2915,7 +2918,7 @@
           <a:p>
             <a:fld id="{91ACB9E3-B631-DE47-A018-DC9FDDBF5249}" type="datetimeFigureOut">
               <a:rPr lang="en-US" smtClean="0"/>
-              <a:t>2023-08-13</a:t>
+              <a:t>8/16/23</a:t>
             </a:fld>
             <a:endParaRPr lang="en-US"/>
           </a:p>
@@ -3203,7 +3206,7 @@
           <a:p>
             <a:fld id="{91ACB9E3-B631-DE47-A018-DC9FDDBF5249}" type="datetimeFigureOut">
               <a:rPr lang="en-US" smtClean="0"/>
-              <a:t>2023-08-13</a:t>
+              <a:t>8/16/23</a:t>
             </a:fld>
             <a:endParaRPr lang="en-US"/>
           </a:p>
@@ -3444,7 +3447,7 @@
           <a:p>
             <a:fld id="{91ACB9E3-B631-DE47-A018-DC9FDDBF5249}" type="datetimeFigureOut">
               <a:rPr lang="en-US" smtClean="0"/>
-              <a:t>2023-08-13</a:t>
+              <a:t>8/16/23</a:t>
             </a:fld>
             <a:endParaRPr lang="en-US"/>
           </a:p>
@@ -5244,6 +5247,1239 @@
           <p:cNvPr id="2" name="Title 1">
             <a:extLst>
               <a:ext uri="{FF2B5EF4-FFF2-40B4-BE49-F238E27FC236}">
+                <a16:creationId xmlns:a16="http://schemas.microsoft.com/office/drawing/2014/main" id="{7F98DC0E-E01D-0B23-ADB9-32D1E828173F}"/>
+              </a:ext>
+            </a:extLst>
+          </p:cNvPr>
+          <p:cNvSpPr>
+            <a:spLocks noGrp="1"/>
+          </p:cNvSpPr>
+          <p:nvPr>
+            <p:ph type="title"/>
+          </p:nvPr>
+        </p:nvSpPr>
+        <p:spPr/>
+        <p:txBody>
+          <a:bodyPr/>
+          <a:lstStyle/>
+          <a:p>
+            <a:r>
+              <a:rPr lang="en-US" b="0" i="0" dirty="0">
+                <a:solidFill>
+                  <a:srgbClr val="374151"/>
+                </a:solidFill>
+                <a:effectLst/>
+                <a:latin typeface="Söhne"/>
+              </a:rPr>
+              <a:t>Web App Deployment Overview</a:t>
+            </a:r>
+            <a:endParaRPr lang="en-US" dirty="0"/>
+          </a:p>
+        </p:txBody>
+      </p:sp>
+      <p:sp>
+        <p:nvSpPr>
+          <p:cNvPr id="3" name="Content Placeholder 2">
+            <a:extLst>
+              <a:ext uri="{FF2B5EF4-FFF2-40B4-BE49-F238E27FC236}">
+                <a16:creationId xmlns:a16="http://schemas.microsoft.com/office/drawing/2014/main" id="{9448A567-25E8-9462-1164-9DCBE933F176}"/>
+              </a:ext>
+            </a:extLst>
+          </p:cNvPr>
+          <p:cNvSpPr>
+            <a:spLocks noGrp="1"/>
+          </p:cNvSpPr>
+          <p:nvPr>
+            <p:ph idx="1"/>
+          </p:nvPr>
+        </p:nvSpPr>
+        <p:spPr/>
+        <p:txBody>
+          <a:bodyPr/>
+          <a:lstStyle/>
+          <a:p>
+            <a:r>
+              <a:rPr lang="en-US" b="1" i="0" dirty="0" err="1">
+                <a:effectLst/>
+                <a:latin typeface="Söhne"/>
+              </a:rPr>
+              <a:t>Dockerize</a:t>
+            </a:r>
+            <a:r>
+              <a:rPr lang="en-US" b="1" i="0" dirty="0">
+                <a:effectLst/>
+                <a:latin typeface="Söhne"/>
+              </a:rPr>
+              <a:t> Web App</a:t>
+            </a:r>
+            <a:r>
+              <a:rPr lang="en-US" b="0" i="0" dirty="0">
+                <a:solidFill>
+                  <a:srgbClr val="374151"/>
+                </a:solidFill>
+                <a:effectLst/>
+                <a:latin typeface="Söhne"/>
+              </a:rPr>
+              <a:t>:</a:t>
+            </a:r>
+            <a:br>
+              <a:rPr lang="en-US" b="0" i="0" dirty="0">
+                <a:solidFill>
+                  <a:srgbClr val="374151"/>
+                </a:solidFill>
+                <a:effectLst/>
+                <a:latin typeface="Söhne"/>
+              </a:rPr>
+            </a:br>
+            <a:r>
+              <a:rPr lang="en-US" b="0" i="0" dirty="0">
+                <a:solidFill>
+                  <a:srgbClr val="374151"/>
+                </a:solidFill>
+                <a:effectLst/>
+                <a:latin typeface="Söhne"/>
+              </a:rPr>
+              <a:t>- Base Image: python:3.9-alpine</a:t>
+            </a:r>
+            <a:br>
+              <a:rPr lang="en-US" b="0" i="0" dirty="0">
+                <a:solidFill>
+                  <a:srgbClr val="374151"/>
+                </a:solidFill>
+                <a:effectLst/>
+                <a:latin typeface="Söhne"/>
+              </a:rPr>
+            </a:br>
+            <a:r>
+              <a:rPr lang="en-US" b="0" i="0" dirty="0">
+                <a:solidFill>
+                  <a:srgbClr val="374151"/>
+                </a:solidFill>
+                <a:effectLst/>
+                <a:latin typeface="Söhne"/>
+              </a:rPr>
+              <a:t>- Packaged the app for a lightweight, efficient deployment</a:t>
+            </a:r>
+          </a:p>
+          <a:p>
+            <a:r>
+              <a:rPr lang="en-US" b="1" i="0" dirty="0">
+                <a:effectLst/>
+                <a:latin typeface="Söhne"/>
+              </a:rPr>
+              <a:t>Kubernetes Deployment</a:t>
+            </a:r>
+            <a:r>
+              <a:rPr lang="en-US" b="0" i="0" dirty="0">
+                <a:solidFill>
+                  <a:srgbClr val="374151"/>
+                </a:solidFill>
+                <a:effectLst/>
+                <a:latin typeface="Söhne"/>
+              </a:rPr>
+              <a:t>:</a:t>
+            </a:r>
+            <a:br>
+              <a:rPr lang="en-US" dirty="0">
+                <a:solidFill>
+                  <a:srgbClr val="374151"/>
+                </a:solidFill>
+                <a:latin typeface="Söhne"/>
+              </a:rPr>
+            </a:br>
+            <a:r>
+              <a:rPr lang="en-US" dirty="0">
+                <a:solidFill>
+                  <a:srgbClr val="374151"/>
+                </a:solidFill>
+                <a:latin typeface="Söhne"/>
+              </a:rPr>
+              <a:t>- </a:t>
+            </a:r>
+            <a:r>
+              <a:rPr lang="en-US" b="0" i="0" dirty="0">
+                <a:solidFill>
+                  <a:srgbClr val="374151"/>
+                </a:solidFill>
+                <a:effectLst/>
+                <a:latin typeface="Söhne"/>
+              </a:rPr>
+              <a:t>Utilized Kubernetes (K8s) for orchestration</a:t>
+            </a:r>
+            <a:br>
+              <a:rPr lang="en-US" dirty="0">
+                <a:solidFill>
+                  <a:srgbClr val="374151"/>
+                </a:solidFill>
+                <a:latin typeface="Söhne"/>
+              </a:rPr>
+            </a:br>
+            <a:r>
+              <a:rPr lang="en-US" dirty="0">
+                <a:solidFill>
+                  <a:srgbClr val="374151"/>
+                </a:solidFill>
+                <a:latin typeface="Söhne"/>
+              </a:rPr>
+              <a:t>- </a:t>
+            </a:r>
+            <a:r>
+              <a:rPr lang="en-US" b="0" i="0" dirty="0">
+                <a:solidFill>
+                  <a:srgbClr val="374151"/>
+                </a:solidFill>
+                <a:effectLst/>
+                <a:latin typeface="Söhne"/>
+              </a:rPr>
+              <a:t>Deployed the Docker image in a K8s deployment</a:t>
+            </a:r>
+            <a:br>
+              <a:rPr lang="en-US" b="0" i="0" dirty="0">
+                <a:solidFill>
+                  <a:srgbClr val="374151"/>
+                </a:solidFill>
+                <a:effectLst/>
+                <a:latin typeface="Söhne"/>
+              </a:rPr>
+            </a:br>
+            <a:r>
+              <a:rPr lang="en-US" b="0" i="0" dirty="0">
+                <a:solidFill>
+                  <a:srgbClr val="374151"/>
+                </a:solidFill>
+                <a:effectLst/>
+                <a:latin typeface="Söhne"/>
+              </a:rPr>
+              <a:t>- Service setup for port-forwarding, ensuring accessibility</a:t>
+            </a:r>
+          </a:p>
+          <a:p>
+            <a:r>
+              <a:rPr lang="en-US" b="1" i="0" dirty="0">
+                <a:effectLst/>
+                <a:latin typeface="Söhne"/>
+              </a:rPr>
+              <a:t>Environment Management</a:t>
+            </a:r>
+            <a:r>
+              <a:rPr lang="en-US" b="0" i="0" dirty="0">
+                <a:solidFill>
+                  <a:srgbClr val="374151"/>
+                </a:solidFill>
+                <a:effectLst/>
+                <a:latin typeface="Söhne"/>
+              </a:rPr>
+              <a:t>:</a:t>
+            </a:r>
+            <a:br>
+              <a:rPr lang="en-US" b="0" i="0" dirty="0">
+                <a:solidFill>
+                  <a:srgbClr val="374151"/>
+                </a:solidFill>
+                <a:effectLst/>
+                <a:latin typeface="Söhne"/>
+              </a:rPr>
+            </a:br>
+            <a:r>
+              <a:rPr lang="en-US" b="0" i="0" dirty="0">
+                <a:solidFill>
+                  <a:srgbClr val="374151"/>
+                </a:solidFill>
+                <a:effectLst/>
+                <a:latin typeface="Söhne"/>
+              </a:rPr>
+              <a:t>- Used K8s secrets</a:t>
+            </a:r>
+            <a:br>
+              <a:rPr lang="en-US" b="0" i="0" dirty="0">
+                <a:solidFill>
+                  <a:srgbClr val="374151"/>
+                </a:solidFill>
+                <a:effectLst/>
+                <a:latin typeface="Söhne"/>
+              </a:rPr>
+            </a:br>
+            <a:r>
+              <a:rPr lang="en-US" b="0" i="0" dirty="0">
+                <a:solidFill>
+                  <a:srgbClr val="374151"/>
+                </a:solidFill>
+                <a:effectLst/>
+                <a:latin typeface="Söhne"/>
+              </a:rPr>
+              <a:t>- Mounted environment variables securely</a:t>
+            </a:r>
+            <a:endParaRPr lang="en-US" dirty="0"/>
+          </a:p>
+        </p:txBody>
+      </p:sp>
+    </p:spTree>
+    <p:extLst>
+      <p:ext uri="{BB962C8B-B14F-4D97-AF65-F5344CB8AC3E}">
+        <p14:creationId xmlns:p14="http://schemas.microsoft.com/office/powerpoint/2010/main" val="1823503204"/>
+      </p:ext>
+    </p:extLst>
+  </p:cSld>
+  <p:clrMapOvr>
+    <a:masterClrMapping/>
+  </p:clrMapOvr>
+</p:sld>
+</file>
+
+<file path=ppt/slides/slide16.xml><?xml version="1.0" encoding="utf-8"?>
+<p:sld xmlns:a="http://schemas.openxmlformats.org/drawingml/2006/main" xmlns:r="http://schemas.openxmlformats.org/officeDocument/2006/relationships" xmlns:p="http://schemas.openxmlformats.org/presentationml/2006/main">
+  <p:cSld>
+    <p:spTree>
+      <p:nvGrpSpPr>
+        <p:cNvPr id="1" name=""/>
+        <p:cNvGrpSpPr/>
+        <p:nvPr/>
+      </p:nvGrpSpPr>
+      <p:grpSpPr>
+        <a:xfrm>
+          <a:off x="0" y="0"/>
+          <a:ext cx="0" cy="0"/>
+          <a:chOff x="0" y="0"/>
+          <a:chExt cx="0" cy="0"/>
+        </a:xfrm>
+      </p:grpSpPr>
+      <p:sp>
+        <p:nvSpPr>
+          <p:cNvPr id="2" name="Title 1">
+            <a:extLst>
+              <a:ext uri="{FF2B5EF4-FFF2-40B4-BE49-F238E27FC236}">
+                <a16:creationId xmlns:a16="http://schemas.microsoft.com/office/drawing/2014/main" id="{3619C678-700E-A137-487F-DC466DBDC5EC}"/>
+              </a:ext>
+            </a:extLst>
+          </p:cNvPr>
+          <p:cNvSpPr>
+            <a:spLocks noGrp="1"/>
+          </p:cNvSpPr>
+          <p:nvPr>
+            <p:ph type="title"/>
+          </p:nvPr>
+        </p:nvSpPr>
+        <p:spPr/>
+        <p:txBody>
+          <a:bodyPr/>
+          <a:lstStyle/>
+          <a:p>
+            <a:r>
+              <a:rPr lang="en-US" dirty="0"/>
+              <a:t>Deploying our app in the cloud env (</a:t>
+            </a:r>
+            <a:r>
+              <a:rPr lang="en-US" dirty="0" err="1"/>
+              <a:t>aws</a:t>
+            </a:r>
+            <a:r>
+              <a:rPr lang="en-US" dirty="0"/>
+              <a:t>)</a:t>
+            </a:r>
+          </a:p>
+        </p:txBody>
+      </p:sp>
+      <p:sp>
+        <p:nvSpPr>
+          <p:cNvPr id="3" name="Content Placeholder 2">
+            <a:extLst>
+              <a:ext uri="{FF2B5EF4-FFF2-40B4-BE49-F238E27FC236}">
+                <a16:creationId xmlns:a16="http://schemas.microsoft.com/office/drawing/2014/main" id="{AAF4B4DB-C352-277E-6B41-B47AE5A2E0E6}"/>
+              </a:ext>
+            </a:extLst>
+          </p:cNvPr>
+          <p:cNvSpPr>
+            <a:spLocks noGrp="1"/>
+          </p:cNvSpPr>
+          <p:nvPr>
+            <p:ph idx="1"/>
+          </p:nvPr>
+        </p:nvSpPr>
+        <p:spPr/>
+        <p:txBody>
+          <a:bodyPr>
+            <a:normAutofit fontScale="85000" lnSpcReduction="20000"/>
+          </a:bodyPr>
+          <a:lstStyle/>
+          <a:p>
+            <a:r>
+              <a:rPr lang="en-US" b="1" i="0" dirty="0">
+                <a:effectLst/>
+                <a:latin typeface="Söhne"/>
+              </a:rPr>
+              <a:t>Cloud Hosting (Amazon EKS)</a:t>
+            </a:r>
+            <a:r>
+              <a:rPr lang="en-US" b="0" i="0" dirty="0">
+                <a:solidFill>
+                  <a:srgbClr val="374151"/>
+                </a:solidFill>
+                <a:effectLst/>
+                <a:latin typeface="Söhne"/>
+              </a:rPr>
+              <a:t>:</a:t>
+            </a:r>
+            <a:br>
+              <a:rPr lang="en-US" b="0" i="0" dirty="0">
+                <a:solidFill>
+                  <a:srgbClr val="374151"/>
+                </a:solidFill>
+                <a:effectLst/>
+                <a:latin typeface="Söhne"/>
+              </a:rPr>
+            </a:br>
+            <a:r>
+              <a:rPr lang="en-US" b="0" i="0" dirty="0">
+                <a:solidFill>
+                  <a:srgbClr val="374151"/>
+                </a:solidFill>
+                <a:effectLst/>
+                <a:latin typeface="Söhne"/>
+              </a:rPr>
+              <a:t>- </a:t>
+            </a:r>
+            <a:r>
+              <a:rPr lang="en-US" b="1" i="0" dirty="0">
+                <a:effectLst/>
+                <a:latin typeface="Söhne"/>
+              </a:rPr>
+              <a:t>Region Selection</a:t>
+            </a:r>
+            <a:r>
+              <a:rPr lang="en-US" b="0" i="0" dirty="0">
+                <a:solidFill>
+                  <a:srgbClr val="374151"/>
+                </a:solidFill>
+                <a:effectLst/>
+                <a:latin typeface="Söhne"/>
+              </a:rPr>
+              <a:t>: Deploy our app in a region close to our primary user base to reduce latency.</a:t>
+            </a:r>
+            <a:br>
+              <a:rPr lang="en-US" b="0" i="0" dirty="0">
+                <a:solidFill>
+                  <a:srgbClr val="374151"/>
+                </a:solidFill>
+                <a:effectLst/>
+                <a:latin typeface="Söhne"/>
+              </a:rPr>
+            </a:br>
+            <a:r>
+              <a:rPr lang="en-US" b="0" i="0" dirty="0">
+                <a:solidFill>
+                  <a:srgbClr val="374151"/>
+                </a:solidFill>
+                <a:effectLst/>
+                <a:latin typeface="Söhne"/>
+              </a:rPr>
+              <a:t>- </a:t>
+            </a:r>
+            <a:r>
+              <a:rPr lang="en-US" b="1" i="0" dirty="0">
+                <a:effectLst/>
+                <a:latin typeface="Söhne"/>
+              </a:rPr>
+              <a:t>High Availability</a:t>
+            </a:r>
+            <a:r>
+              <a:rPr lang="en-US" b="0" i="0" dirty="0">
+                <a:solidFill>
+                  <a:srgbClr val="374151"/>
+                </a:solidFill>
+                <a:effectLst/>
+                <a:latin typeface="Söhne"/>
+              </a:rPr>
+              <a:t>: Deploy across multiple availability zones.</a:t>
+            </a:r>
+          </a:p>
+          <a:p>
+            <a:r>
+              <a:rPr lang="en-US" b="1" i="0" dirty="0">
+                <a:effectLst/>
+                <a:latin typeface="Söhne"/>
+              </a:rPr>
+              <a:t>User Protocol (HTTPS)</a:t>
+            </a:r>
+            <a:r>
+              <a:rPr lang="en-US" b="0" i="0" dirty="0">
+                <a:solidFill>
+                  <a:srgbClr val="374151"/>
+                </a:solidFill>
+                <a:effectLst/>
+                <a:latin typeface="Söhne"/>
+              </a:rPr>
+              <a:t>:</a:t>
+            </a:r>
+            <a:br>
+              <a:rPr lang="en-US" dirty="0">
+                <a:solidFill>
+                  <a:srgbClr val="374151"/>
+                </a:solidFill>
+                <a:latin typeface="Söhne"/>
+              </a:rPr>
+            </a:br>
+            <a:r>
+              <a:rPr lang="en-US" dirty="0">
+                <a:solidFill>
+                  <a:srgbClr val="374151"/>
+                </a:solidFill>
+                <a:latin typeface="Söhne"/>
+              </a:rPr>
+              <a:t>- </a:t>
+            </a:r>
+            <a:r>
+              <a:rPr lang="en-US" b="0" i="0" dirty="0">
+                <a:solidFill>
+                  <a:srgbClr val="374151"/>
+                </a:solidFill>
+                <a:effectLst/>
+                <a:latin typeface="Söhne"/>
+              </a:rPr>
+              <a:t>Use AWS Certificate Manager (ACM) to generate an SSL certificate.</a:t>
+            </a:r>
+            <a:br>
+              <a:rPr lang="en-US" dirty="0">
+                <a:solidFill>
+                  <a:srgbClr val="374151"/>
+                </a:solidFill>
+                <a:latin typeface="Söhne"/>
+              </a:rPr>
+            </a:br>
+            <a:r>
+              <a:rPr lang="en-US" dirty="0">
+                <a:solidFill>
+                  <a:srgbClr val="374151"/>
+                </a:solidFill>
+                <a:latin typeface="Söhne"/>
+              </a:rPr>
+              <a:t>- </a:t>
+            </a:r>
+            <a:r>
+              <a:rPr lang="en-US" b="0" i="0" dirty="0">
+                <a:solidFill>
+                  <a:srgbClr val="374151"/>
+                </a:solidFill>
+                <a:effectLst/>
+                <a:latin typeface="Söhne"/>
+              </a:rPr>
+              <a:t>Implement AWS ALB (Application Load Balancer) Ingress Controller in EKS, which automatically uses the ACM certificate for HTTPS.</a:t>
+            </a:r>
+            <a:br>
+              <a:rPr lang="en-US" dirty="0">
+                <a:solidFill>
+                  <a:srgbClr val="374151"/>
+                </a:solidFill>
+                <a:latin typeface="Söhne"/>
+              </a:rPr>
+            </a:br>
+            <a:r>
+              <a:rPr lang="en-US" dirty="0">
+                <a:solidFill>
+                  <a:srgbClr val="374151"/>
+                </a:solidFill>
+                <a:latin typeface="Söhne"/>
+              </a:rPr>
+              <a:t>- </a:t>
+            </a:r>
+            <a:r>
+              <a:rPr lang="en-US" b="0" i="0" dirty="0">
+                <a:solidFill>
+                  <a:srgbClr val="374151"/>
+                </a:solidFill>
+                <a:effectLst/>
+                <a:latin typeface="Söhne"/>
+              </a:rPr>
+              <a:t>Ensure redirects from HTTP to HTTPS.</a:t>
+            </a:r>
+            <a:endParaRPr lang="en-US" dirty="0">
+              <a:solidFill>
+                <a:srgbClr val="374151"/>
+              </a:solidFill>
+              <a:latin typeface="Söhne"/>
+            </a:endParaRPr>
+          </a:p>
+          <a:p>
+            <a:r>
+              <a:rPr lang="en-US" b="1" i="0" dirty="0">
+                <a:effectLst/>
+                <a:latin typeface="Söhne"/>
+              </a:rPr>
+              <a:t>Scalability</a:t>
+            </a:r>
+            <a:r>
+              <a:rPr lang="en-US" b="0" i="0" dirty="0">
+                <a:solidFill>
+                  <a:srgbClr val="374151"/>
+                </a:solidFill>
+                <a:effectLst/>
+                <a:latin typeface="Söhne"/>
+              </a:rPr>
+              <a:t>:</a:t>
+            </a:r>
+            <a:br>
+              <a:rPr lang="en-US" b="0" i="0" dirty="0">
+                <a:solidFill>
+                  <a:srgbClr val="374151"/>
+                </a:solidFill>
+                <a:effectLst/>
+                <a:latin typeface="Söhne"/>
+              </a:rPr>
+            </a:br>
+            <a:r>
+              <a:rPr lang="en-US" b="0" i="0" dirty="0">
+                <a:solidFill>
+                  <a:srgbClr val="374151"/>
+                </a:solidFill>
+                <a:effectLst/>
+                <a:latin typeface="Söhne"/>
+              </a:rPr>
+              <a:t>- Horizontal Pod Scaling: use Horizontal Pod </a:t>
+            </a:r>
+            <a:r>
+              <a:rPr lang="en-US" b="0" i="0" dirty="0" err="1">
+                <a:solidFill>
+                  <a:srgbClr val="374151"/>
+                </a:solidFill>
+                <a:effectLst/>
+                <a:latin typeface="Söhne"/>
+              </a:rPr>
+              <a:t>Autoscaler</a:t>
+            </a:r>
+            <a:r>
+              <a:rPr lang="en-US" b="0" i="0" dirty="0">
+                <a:solidFill>
+                  <a:srgbClr val="374151"/>
+                </a:solidFill>
+                <a:effectLst/>
+                <a:latin typeface="Söhne"/>
+              </a:rPr>
+              <a:t> (HPA) to scale the number of pod replicas based on observed CPU utilization or other select metrics.</a:t>
+            </a:r>
+            <a:br>
+              <a:rPr lang="en-US" b="0" i="0" dirty="0">
+                <a:solidFill>
+                  <a:srgbClr val="374151"/>
+                </a:solidFill>
+                <a:effectLst/>
+                <a:latin typeface="Söhne"/>
+              </a:rPr>
+            </a:br>
+            <a:r>
+              <a:rPr lang="en-US" b="0" i="0" dirty="0">
+                <a:solidFill>
+                  <a:srgbClr val="374151"/>
+                </a:solidFill>
+                <a:effectLst/>
+                <a:latin typeface="Söhne"/>
+              </a:rPr>
+              <a:t>- Horizontal Node Scaling: Use the Cluster </a:t>
+            </a:r>
+            <a:r>
+              <a:rPr lang="en-US" b="0" i="0" dirty="0" err="1">
+                <a:solidFill>
+                  <a:srgbClr val="374151"/>
+                </a:solidFill>
+                <a:effectLst/>
+                <a:latin typeface="Söhne"/>
+              </a:rPr>
+              <a:t>Autoscaler</a:t>
+            </a:r>
+            <a:r>
+              <a:rPr lang="en-US" b="0" i="0" dirty="0">
+                <a:solidFill>
+                  <a:srgbClr val="374151"/>
+                </a:solidFill>
+                <a:effectLst/>
+                <a:latin typeface="Söhne"/>
+              </a:rPr>
+              <a:t>. It will automatically adjust the number of nodes as needed.</a:t>
+            </a:r>
+          </a:p>
+          <a:p>
+            <a:endParaRPr lang="en-US" b="0" i="0" dirty="0">
+              <a:solidFill>
+                <a:srgbClr val="374151"/>
+              </a:solidFill>
+              <a:effectLst/>
+              <a:latin typeface="Söhne"/>
+            </a:endParaRPr>
+          </a:p>
+          <a:p>
+            <a:endParaRPr lang="en-US" dirty="0"/>
+          </a:p>
+        </p:txBody>
+      </p:sp>
+    </p:spTree>
+    <p:extLst>
+      <p:ext uri="{BB962C8B-B14F-4D97-AF65-F5344CB8AC3E}">
+        <p14:creationId xmlns:p14="http://schemas.microsoft.com/office/powerpoint/2010/main" val="1435649091"/>
+      </p:ext>
+    </p:extLst>
+  </p:cSld>
+  <p:clrMapOvr>
+    <a:masterClrMapping/>
+  </p:clrMapOvr>
+</p:sld>
+</file>
+
+<file path=ppt/slides/slide17.xml><?xml version="1.0" encoding="utf-8"?>
+<p:sld xmlns:a="http://schemas.openxmlformats.org/drawingml/2006/main" xmlns:r="http://schemas.openxmlformats.org/officeDocument/2006/relationships" xmlns:p="http://schemas.openxmlformats.org/presentationml/2006/main">
+  <p:cSld>
+    <p:spTree>
+      <p:nvGrpSpPr>
+        <p:cNvPr id="1" name=""/>
+        <p:cNvGrpSpPr/>
+        <p:nvPr/>
+      </p:nvGrpSpPr>
+      <p:grpSpPr>
+        <a:xfrm>
+          <a:off x="0" y="0"/>
+          <a:ext cx="0" cy="0"/>
+          <a:chOff x="0" y="0"/>
+          <a:chExt cx="0" cy="0"/>
+        </a:xfrm>
+      </p:grpSpPr>
+      <p:sp>
+        <p:nvSpPr>
+          <p:cNvPr id="2" name="Title 1">
+            <a:extLst>
+              <a:ext uri="{FF2B5EF4-FFF2-40B4-BE49-F238E27FC236}">
+                <a16:creationId xmlns:a16="http://schemas.microsoft.com/office/drawing/2014/main" id="{3619C678-700E-A137-487F-DC466DBDC5EC}"/>
+              </a:ext>
+            </a:extLst>
+          </p:cNvPr>
+          <p:cNvSpPr>
+            <a:spLocks noGrp="1"/>
+          </p:cNvSpPr>
+          <p:nvPr>
+            <p:ph type="title"/>
+          </p:nvPr>
+        </p:nvSpPr>
+        <p:spPr/>
+        <p:txBody>
+          <a:bodyPr/>
+          <a:lstStyle/>
+          <a:p>
+            <a:r>
+              <a:rPr lang="en-US" dirty="0"/>
+              <a:t>Deploying our app in the cloud env (</a:t>
+            </a:r>
+            <a:r>
+              <a:rPr lang="en-US" dirty="0" err="1"/>
+              <a:t>aws</a:t>
+            </a:r>
+            <a:r>
+              <a:rPr lang="en-US" dirty="0"/>
+              <a:t>)</a:t>
+            </a:r>
+          </a:p>
+        </p:txBody>
+      </p:sp>
+      <p:sp>
+        <p:nvSpPr>
+          <p:cNvPr id="3" name="Content Placeholder 2">
+            <a:extLst>
+              <a:ext uri="{FF2B5EF4-FFF2-40B4-BE49-F238E27FC236}">
+                <a16:creationId xmlns:a16="http://schemas.microsoft.com/office/drawing/2014/main" id="{AAF4B4DB-C352-277E-6B41-B47AE5A2E0E6}"/>
+              </a:ext>
+            </a:extLst>
+          </p:cNvPr>
+          <p:cNvSpPr>
+            <a:spLocks noGrp="1"/>
+          </p:cNvSpPr>
+          <p:nvPr>
+            <p:ph idx="1"/>
+          </p:nvPr>
+        </p:nvSpPr>
+        <p:spPr/>
+        <p:txBody>
+          <a:bodyPr>
+            <a:normAutofit fontScale="70000" lnSpcReduction="20000"/>
+          </a:bodyPr>
+          <a:lstStyle/>
+          <a:p>
+            <a:r>
+              <a:rPr lang="en-US" b="1" i="0" dirty="0">
+                <a:effectLst/>
+                <a:latin typeface="Söhne"/>
+              </a:rPr>
+              <a:t>Security</a:t>
+            </a:r>
+            <a:r>
+              <a:rPr lang="en-US" b="0" i="0" dirty="0">
+                <a:solidFill>
+                  <a:srgbClr val="374151"/>
+                </a:solidFill>
+                <a:effectLst/>
+                <a:latin typeface="Söhne"/>
+              </a:rPr>
+              <a:t>:</a:t>
+            </a:r>
+            <a:br>
+              <a:rPr lang="en-US" b="0" i="0" dirty="0">
+                <a:solidFill>
+                  <a:srgbClr val="374151"/>
+                </a:solidFill>
+                <a:effectLst/>
+                <a:latin typeface="Söhne"/>
+              </a:rPr>
+            </a:br>
+            <a:r>
+              <a:rPr lang="en-US" altLang="zh-CN" b="0" i="0" dirty="0">
+                <a:solidFill>
+                  <a:srgbClr val="374151"/>
+                </a:solidFill>
+                <a:effectLst/>
+                <a:latin typeface="Söhne"/>
+              </a:rPr>
+              <a:t>-</a:t>
+            </a:r>
+            <a:r>
+              <a:rPr lang="zh-CN" altLang="en-US" b="0" i="0" dirty="0">
+                <a:solidFill>
+                  <a:srgbClr val="374151"/>
+                </a:solidFill>
+                <a:effectLst/>
+                <a:latin typeface="Söhne"/>
+              </a:rPr>
+              <a:t> </a:t>
+            </a:r>
+            <a:r>
+              <a:rPr lang="en-US" altLang="zh-CN" b="0" i="0" dirty="0">
+                <a:solidFill>
+                  <a:srgbClr val="374151"/>
+                </a:solidFill>
+                <a:effectLst/>
+                <a:latin typeface="Söhne"/>
+              </a:rPr>
+              <a:t>IAM Roles: Assign minimal necessary AWS permissions using IAM roles. Integrate IAM with Kubernetes RBAC.</a:t>
+            </a:r>
+            <a:br>
+              <a:rPr lang="en-US" altLang="zh-CN" b="0" i="0" dirty="0">
+                <a:solidFill>
+                  <a:srgbClr val="374151"/>
+                </a:solidFill>
+                <a:effectLst/>
+                <a:latin typeface="Söhne"/>
+              </a:rPr>
+            </a:br>
+            <a:r>
+              <a:rPr lang="en-US" altLang="zh-CN" b="0" i="0" dirty="0">
+                <a:solidFill>
+                  <a:srgbClr val="374151"/>
+                </a:solidFill>
+                <a:effectLst/>
+                <a:latin typeface="Söhne"/>
+              </a:rPr>
+              <a:t>-</a:t>
+            </a:r>
+            <a:r>
+              <a:rPr lang="zh-CN" altLang="en-US" b="0" i="0" dirty="0">
+                <a:solidFill>
+                  <a:srgbClr val="374151"/>
+                </a:solidFill>
+                <a:effectLst/>
+                <a:latin typeface="Söhne"/>
+              </a:rPr>
+              <a:t> </a:t>
+            </a:r>
+            <a:r>
+              <a:rPr lang="en-US" altLang="zh-CN" b="0" i="0" dirty="0">
+                <a:solidFill>
+                  <a:srgbClr val="374151"/>
+                </a:solidFill>
+                <a:effectLst/>
+                <a:latin typeface="Söhne"/>
+              </a:rPr>
+              <a:t>Secrets: Use AWS Secrets Manager or KMS (Key Management Service) for storing secrets. Integrate with Kubernetes using tools like external-secrets.</a:t>
+            </a:r>
+            <a:br>
+              <a:rPr lang="en-US" altLang="zh-CN" b="0" i="0" dirty="0">
+                <a:solidFill>
+                  <a:srgbClr val="374151"/>
+                </a:solidFill>
+                <a:effectLst/>
+                <a:latin typeface="Söhne"/>
+              </a:rPr>
+            </a:br>
+            <a:r>
+              <a:rPr lang="en-US" altLang="zh-CN" b="0" i="0" dirty="0">
+                <a:solidFill>
+                  <a:srgbClr val="374151"/>
+                </a:solidFill>
+                <a:effectLst/>
+                <a:latin typeface="Söhne"/>
+              </a:rPr>
+              <a:t>-</a:t>
+            </a:r>
+            <a:r>
+              <a:rPr lang="zh-CN" altLang="en-US" b="0" i="0" dirty="0">
+                <a:solidFill>
+                  <a:srgbClr val="374151"/>
+                </a:solidFill>
+                <a:effectLst/>
+                <a:latin typeface="Söhne"/>
+              </a:rPr>
+              <a:t> </a:t>
+            </a:r>
+            <a:r>
+              <a:rPr lang="en-US" altLang="zh-CN" b="0" i="0" dirty="0">
+                <a:solidFill>
+                  <a:srgbClr val="374151"/>
+                </a:solidFill>
+                <a:effectLst/>
+                <a:latin typeface="Söhne"/>
+              </a:rPr>
+              <a:t>Patch Management: Regularly update and patch your containers and nodes. Consider using tools like </a:t>
+            </a:r>
+            <a:r>
+              <a:rPr lang="en-US" altLang="zh-CN" b="0" i="0" dirty="0" err="1">
+                <a:solidFill>
+                  <a:srgbClr val="374151"/>
+                </a:solidFill>
+                <a:effectLst/>
+                <a:latin typeface="Söhne"/>
+              </a:rPr>
+              <a:t>kube</a:t>
+            </a:r>
+            <a:r>
+              <a:rPr lang="en-US" altLang="zh-CN" b="0" i="0" dirty="0">
+                <a:solidFill>
+                  <a:srgbClr val="374151"/>
+                </a:solidFill>
+                <a:effectLst/>
+                <a:latin typeface="Söhne"/>
+              </a:rPr>
+              <a:t>-bench for security benchmarking.</a:t>
+            </a:r>
+          </a:p>
+          <a:p>
+            <a:r>
+              <a:rPr lang="en-US" b="1" i="0" dirty="0">
+                <a:effectLst/>
+                <a:latin typeface="Söhne"/>
+              </a:rPr>
+              <a:t>Server-Side Node (Node Configuration)</a:t>
+            </a:r>
+            <a:r>
+              <a:rPr lang="en-US" b="0" i="0" dirty="0">
+                <a:solidFill>
+                  <a:srgbClr val="374151"/>
+                </a:solidFill>
+                <a:effectLst/>
+                <a:latin typeface="Söhne"/>
+              </a:rPr>
+              <a:t>:</a:t>
+            </a:r>
+            <a:br>
+              <a:rPr lang="en-US" dirty="0">
+                <a:solidFill>
+                  <a:srgbClr val="374151"/>
+                </a:solidFill>
+                <a:latin typeface="Söhne"/>
+              </a:rPr>
+            </a:br>
+            <a:r>
+              <a:rPr lang="en-US" altLang="zh-CN" dirty="0">
+                <a:solidFill>
+                  <a:srgbClr val="374151"/>
+                </a:solidFill>
+                <a:latin typeface="Söhne"/>
+              </a:rPr>
+              <a:t>-</a:t>
+            </a:r>
+            <a:r>
+              <a:rPr lang="zh-CN" altLang="en-US" dirty="0">
+                <a:solidFill>
+                  <a:srgbClr val="374151"/>
+                </a:solidFill>
+                <a:latin typeface="Söhne"/>
+              </a:rPr>
+              <a:t> </a:t>
+            </a:r>
+            <a:r>
+              <a:rPr lang="en-US" altLang="zh-CN" dirty="0">
+                <a:solidFill>
+                  <a:srgbClr val="374151"/>
+                </a:solidFill>
+                <a:latin typeface="Söhne"/>
+              </a:rPr>
+              <a:t>Node Groups: Use different node groups for different types of workloads (e.g., CPU-intensive, memory-intensive).</a:t>
+            </a:r>
+            <a:br>
+              <a:rPr lang="en-US" altLang="zh-CN" dirty="0">
+                <a:solidFill>
+                  <a:srgbClr val="374151"/>
+                </a:solidFill>
+                <a:latin typeface="Söhne"/>
+              </a:rPr>
+            </a:br>
+            <a:r>
+              <a:rPr lang="en-US" altLang="zh-CN" dirty="0">
+                <a:solidFill>
+                  <a:srgbClr val="374151"/>
+                </a:solidFill>
+                <a:latin typeface="Söhne"/>
+              </a:rPr>
+              <a:t>-</a:t>
+            </a:r>
+            <a:r>
+              <a:rPr lang="zh-CN" altLang="en-US" dirty="0">
+                <a:solidFill>
+                  <a:srgbClr val="374151"/>
+                </a:solidFill>
+                <a:latin typeface="Söhne"/>
+              </a:rPr>
+              <a:t> </a:t>
+            </a:r>
+            <a:r>
+              <a:rPr lang="en-US" altLang="zh-CN" dirty="0">
+                <a:solidFill>
+                  <a:srgbClr val="374151"/>
+                </a:solidFill>
+                <a:latin typeface="Söhne"/>
+              </a:rPr>
+              <a:t>Node Affinity: Ensure specific pods run on specific types of nodes.</a:t>
+            </a:r>
+            <a:br>
+              <a:rPr lang="en-US" altLang="zh-CN" dirty="0">
+                <a:solidFill>
+                  <a:srgbClr val="374151"/>
+                </a:solidFill>
+                <a:latin typeface="Söhne"/>
+              </a:rPr>
+            </a:br>
+            <a:r>
+              <a:rPr lang="en-US" altLang="zh-CN" dirty="0">
+                <a:solidFill>
+                  <a:srgbClr val="374151"/>
+                </a:solidFill>
+                <a:latin typeface="Söhne"/>
+              </a:rPr>
+              <a:t>-</a:t>
+            </a:r>
+            <a:r>
+              <a:rPr lang="zh-CN" altLang="en-US" dirty="0">
+                <a:solidFill>
+                  <a:srgbClr val="374151"/>
+                </a:solidFill>
+                <a:latin typeface="Söhne"/>
+              </a:rPr>
+              <a:t> </a:t>
+            </a:r>
+            <a:r>
+              <a:rPr lang="en-US" altLang="zh-CN" dirty="0">
+                <a:solidFill>
+                  <a:srgbClr val="374151"/>
+                </a:solidFill>
+                <a:latin typeface="Söhne"/>
+              </a:rPr>
+              <a:t>Taints and Tolerations: Prevent certain pods from running on certain nodes.</a:t>
+            </a:r>
+          </a:p>
+          <a:p>
+            <a:r>
+              <a:rPr lang="en-US" b="1" i="0" dirty="0">
+                <a:effectLst/>
+                <a:latin typeface="Söhne"/>
+              </a:rPr>
+              <a:t>User Visitor Increase</a:t>
+            </a:r>
+            <a:r>
+              <a:rPr lang="en-US" b="0" i="0" dirty="0">
+                <a:solidFill>
+                  <a:srgbClr val="374151"/>
+                </a:solidFill>
+                <a:effectLst/>
+                <a:latin typeface="Söhne"/>
+              </a:rPr>
+              <a:t>:</a:t>
+            </a:r>
+            <a:br>
+              <a:rPr lang="en-US" b="0" i="0" dirty="0">
+                <a:solidFill>
+                  <a:srgbClr val="374151"/>
+                </a:solidFill>
+                <a:effectLst/>
+                <a:latin typeface="Söhne"/>
+              </a:rPr>
+            </a:br>
+            <a:r>
+              <a:rPr lang="en-US" altLang="zh-CN" b="0" i="0" dirty="0">
+                <a:solidFill>
+                  <a:srgbClr val="374151"/>
+                </a:solidFill>
+                <a:effectLst/>
+                <a:latin typeface="Söhne"/>
+              </a:rPr>
+              <a:t>-</a:t>
+            </a:r>
+            <a:r>
+              <a:rPr lang="zh-CN" altLang="en-US" b="0" i="0" dirty="0">
+                <a:solidFill>
+                  <a:srgbClr val="374151"/>
+                </a:solidFill>
+                <a:effectLst/>
+                <a:latin typeface="Söhne"/>
+              </a:rPr>
+              <a:t> </a:t>
+            </a:r>
+            <a:r>
+              <a:rPr lang="en-US" altLang="zh-CN" b="0" i="0" dirty="0">
+                <a:solidFill>
+                  <a:srgbClr val="374151"/>
+                </a:solidFill>
+                <a:effectLst/>
+                <a:latin typeface="Söhne"/>
+              </a:rPr>
+              <a:t>Monitor: Use tools like Amazon CloudWatch and Prometheus to monitor cluster, node, and pod performance.</a:t>
+            </a:r>
+            <a:br>
+              <a:rPr lang="en-US" altLang="zh-CN" b="0" i="0" dirty="0">
+                <a:solidFill>
+                  <a:srgbClr val="374151"/>
+                </a:solidFill>
+                <a:effectLst/>
+                <a:latin typeface="Söhne"/>
+              </a:rPr>
+            </a:br>
+            <a:r>
+              <a:rPr lang="en-US" altLang="zh-CN" b="0" i="0" dirty="0">
+                <a:solidFill>
+                  <a:srgbClr val="374151"/>
+                </a:solidFill>
+                <a:effectLst/>
+                <a:latin typeface="Söhne"/>
+              </a:rPr>
+              <a:t>-</a:t>
+            </a:r>
+            <a:r>
+              <a:rPr lang="zh-CN" altLang="en-US" b="0" i="0" dirty="0">
+                <a:solidFill>
+                  <a:srgbClr val="374151"/>
+                </a:solidFill>
+                <a:effectLst/>
+                <a:latin typeface="Söhne"/>
+              </a:rPr>
+              <a:t> </a:t>
+            </a:r>
+            <a:r>
+              <a:rPr lang="en-US" altLang="zh-CN" b="0" i="0" dirty="0">
+                <a:solidFill>
+                  <a:srgbClr val="374151"/>
+                </a:solidFill>
+                <a:effectLst/>
+                <a:latin typeface="Söhne"/>
+              </a:rPr>
+              <a:t>Alert: Set up alerts for high CPU, memory usage, or increased error rates.</a:t>
+            </a:r>
+            <a:br>
+              <a:rPr lang="en-US" altLang="zh-CN" b="0" i="0" dirty="0">
+                <a:solidFill>
+                  <a:srgbClr val="374151"/>
+                </a:solidFill>
+                <a:effectLst/>
+                <a:latin typeface="Söhne"/>
+              </a:rPr>
+            </a:br>
+            <a:r>
+              <a:rPr lang="en-US" altLang="zh-CN" b="0" i="0" dirty="0">
+                <a:solidFill>
+                  <a:srgbClr val="374151"/>
+                </a:solidFill>
+                <a:effectLst/>
+                <a:latin typeface="Söhne"/>
+              </a:rPr>
+              <a:t>-</a:t>
+            </a:r>
+            <a:r>
+              <a:rPr lang="zh-CN" altLang="en-US" b="0" i="0" dirty="0">
+                <a:solidFill>
+                  <a:srgbClr val="374151"/>
+                </a:solidFill>
+                <a:effectLst/>
+                <a:latin typeface="Söhne"/>
+              </a:rPr>
+              <a:t> </a:t>
+            </a:r>
+            <a:r>
+              <a:rPr lang="en-US" altLang="zh-CN" b="0" i="0" dirty="0">
+                <a:solidFill>
+                  <a:srgbClr val="374151"/>
+                </a:solidFill>
+                <a:effectLst/>
+                <a:latin typeface="Söhne"/>
+              </a:rPr>
+              <a:t>Caching: Use caching mechanisms (e.g., Amazon </a:t>
+            </a:r>
+            <a:r>
+              <a:rPr lang="en-US" altLang="zh-CN" b="0" i="0" dirty="0" err="1">
+                <a:solidFill>
+                  <a:srgbClr val="374151"/>
+                </a:solidFill>
+                <a:effectLst/>
+                <a:latin typeface="Söhne"/>
+              </a:rPr>
+              <a:t>ElastiCache</a:t>
+            </a:r>
+            <a:r>
+              <a:rPr lang="en-US" altLang="zh-CN" b="0" i="0" dirty="0">
+                <a:solidFill>
+                  <a:srgbClr val="374151"/>
+                </a:solidFill>
+                <a:effectLst/>
+                <a:latin typeface="Söhne"/>
+              </a:rPr>
+              <a:t>) to alleviate database load and reduce response times.</a:t>
+            </a:r>
+            <a:endParaRPr lang="en-US" b="0" i="0" dirty="0">
+              <a:solidFill>
+                <a:srgbClr val="374151"/>
+              </a:solidFill>
+              <a:effectLst/>
+              <a:latin typeface="Söhne"/>
+            </a:endParaRPr>
+          </a:p>
+          <a:p>
+            <a:endParaRPr lang="en-US" dirty="0"/>
+          </a:p>
+        </p:txBody>
+      </p:sp>
+    </p:spTree>
+    <p:extLst>
+      <p:ext uri="{BB962C8B-B14F-4D97-AF65-F5344CB8AC3E}">
+        <p14:creationId xmlns:p14="http://schemas.microsoft.com/office/powerpoint/2010/main" val="2495466222"/>
+      </p:ext>
+    </p:extLst>
+  </p:cSld>
+  <p:clrMapOvr>
+    <a:masterClrMapping/>
+  </p:clrMapOvr>
+</p:sld>
+</file>
+
+<file path=ppt/slides/slide18.xml><?xml version="1.0" encoding="utf-8"?>
+<p:sld xmlns:a="http://schemas.openxmlformats.org/drawingml/2006/main" xmlns:r="http://schemas.openxmlformats.org/officeDocument/2006/relationships" xmlns:p="http://schemas.openxmlformats.org/presentationml/2006/main">
+  <p:cSld>
+    <p:spTree>
+      <p:nvGrpSpPr>
+        <p:cNvPr id="1" name=""/>
+        <p:cNvGrpSpPr/>
+        <p:nvPr/>
+      </p:nvGrpSpPr>
+      <p:grpSpPr>
+        <a:xfrm>
+          <a:off x="0" y="0"/>
+          <a:ext cx="0" cy="0"/>
+          <a:chOff x="0" y="0"/>
+          <a:chExt cx="0" cy="0"/>
+        </a:xfrm>
+      </p:grpSpPr>
+      <p:sp>
+        <p:nvSpPr>
+          <p:cNvPr id="2" name="Title 1">
+            <a:extLst>
+              <a:ext uri="{FF2B5EF4-FFF2-40B4-BE49-F238E27FC236}">
                 <a16:creationId xmlns:a16="http://schemas.microsoft.com/office/drawing/2014/main" id="{809C5B61-AC9F-FE90-497D-86FEB550190C}"/>
               </a:ext>
             </a:extLst>
@@ -5447,7 +6683,7 @@
 </p:sld>
 </file>
 
-<file path=ppt/slides/slide16.xml><?xml version="1.0" encoding="utf-8"?>
+<file path=ppt/slides/slide19.xml><?xml version="1.0" encoding="utf-8"?>
 <p:sld xmlns:a="http://schemas.openxmlformats.org/drawingml/2006/main" xmlns:r="http://schemas.openxmlformats.org/officeDocument/2006/relationships" xmlns:p="http://schemas.openxmlformats.org/presentationml/2006/main">
   <p:cSld>
     <p:spTree>

</xml_diff>

<commit_message>
Jay Zhang update slides again
</commit_message>
<xml_diff>
--- a/chatbot-backend/team 8 AI Mavericks_v2_20230813.pptx
+++ b/chatbot-backend/team 8 AI Mavericks_v2_20230813.pptx
@@ -7817,7 +7817,7 @@
         </p:blipFill>
         <p:spPr>
           <a:xfrm>
-            <a:off x="20" y="10"/>
+            <a:off x="-1504" y="11"/>
             <a:ext cx="12191980" cy="6857989"/>
           </a:xfrm>
           <a:prstGeom prst="rect">
@@ -8010,7 +8010,7 @@
           <a:lstStyle/>
           <a:p>
             <a:r>
-              <a:rPr lang="en-US" sz="6000" b="0" i="0">
+              <a:rPr lang="en-US" sz="6000" b="0" i="0" dirty="0">
                 <a:solidFill>
                   <a:srgbClr val="FFFFFF"/>
                 </a:solidFill>
@@ -8019,11 +8019,71 @@
               </a:rPr>
               <a:t>AI-Powered Medical Doctor Category Recommendation System</a:t>
             </a:r>
-            <a:endParaRPr lang="en-US" sz="6000">
+            <a:endParaRPr lang="en-US" sz="6000" dirty="0">
               <a:solidFill>
                 <a:srgbClr val="FFFFFF"/>
               </a:solidFill>
             </a:endParaRPr>
+          </a:p>
+        </p:txBody>
+      </p:sp>
+      <p:sp>
+        <p:nvSpPr>
+          <p:cNvPr id="3" name="TextBox 2">
+            <a:extLst>
+              <a:ext uri="{FF2B5EF4-FFF2-40B4-BE49-F238E27FC236}">
+                <a16:creationId xmlns:a16="http://schemas.microsoft.com/office/drawing/2014/main" id="{36AF1B09-7331-ED62-0729-E18BC6163410}"/>
+              </a:ext>
+            </a:extLst>
+          </p:cNvPr>
+          <p:cNvSpPr txBox="1"/>
+          <p:nvPr/>
+        </p:nvSpPr>
+        <p:spPr>
+          <a:xfrm>
+            <a:off x="4601497" y="6120581"/>
+            <a:ext cx="4837471" cy="369332"/>
+          </a:xfrm>
+          <a:prstGeom prst="rect">
+            <a:avLst/>
+          </a:prstGeom>
+          <a:noFill/>
+        </p:spPr>
+        <p:txBody>
+          <a:bodyPr wrap="square" rtlCol="0">
+            <a:spAutoFit/>
+          </a:bodyPr>
+          <a:lstStyle/>
+          <a:p>
+            <a:r>
+              <a:rPr lang="en-US" altLang="zh-CN" dirty="0"/>
+              <a:t>Team</a:t>
+            </a:r>
+            <a:r>
+              <a:rPr lang="zh-CN" altLang="en-US" dirty="0"/>
+              <a:t> </a:t>
+            </a:r>
+            <a:r>
+              <a:rPr lang="en-US" altLang="zh-CN" dirty="0"/>
+              <a:t>8</a:t>
+            </a:r>
+            <a:r>
+              <a:rPr lang="zh-CN" altLang="en-US" dirty="0"/>
+              <a:t> </a:t>
+            </a:r>
+            <a:r>
+              <a:rPr lang="en-US" altLang="zh-CN" dirty="0"/>
+              <a:t>AI</a:t>
+            </a:r>
+            <a:r>
+              <a:rPr lang="zh-CN" altLang="en-US" dirty="0"/>
+              <a:t> </a:t>
+            </a:r>
+            <a:r>
+              <a:rPr lang="en-US" altLang="zh-CN" dirty="0"/>
+              <a:t>Mavericks</a:t>
+            </a:r>
+            <a:endParaRPr lang="en-US" dirty="0"/>
           </a:p>
         </p:txBody>
       </p:sp>
@@ -11310,7 +11370,7 @@
         </p:nvSpPr>
         <p:spPr>
           <a:xfrm>
-            <a:off x="382280" y="484632"/>
+            <a:off x="382279" y="163357"/>
             <a:ext cx="6743844" cy="1609344"/>
           </a:xfrm>
         </p:spPr>
@@ -11321,13 +11381,13 @@
           <a:lstStyle/>
           <a:p>
             <a:r>
-              <a:rPr lang="en-US" sz="4800" b="0" i="0">
+              <a:rPr lang="en-US" sz="4800" b="0" i="0" dirty="0">
                 <a:effectLst/>
                 <a:latin typeface="Söhne"/>
               </a:rPr>
               <a:t>Introduction</a:t>
             </a:r>
-            <a:endParaRPr lang="en-US" sz="4800"/>
+            <a:endParaRPr lang="en-US" sz="4800" dirty="0"/>
           </a:p>
         </p:txBody>
       </p:sp>
@@ -11349,13 +11409,13 @@
         </p:nvSpPr>
         <p:spPr>
           <a:xfrm>
-            <a:off x="382279" y="2121408"/>
-            <a:ext cx="6743845" cy="4050792"/>
+            <a:off x="333075" y="1929530"/>
+            <a:ext cx="7162995" cy="4528751"/>
           </a:xfrm>
         </p:spPr>
         <p:txBody>
           <a:bodyPr>
-            <a:normAutofit/>
+            <a:normAutofit lnSpcReduction="10000"/>
           </a:bodyPr>
           <a:lstStyle/>
           <a:p>
@@ -11364,7 +11424,7 @@
               <a:buChar char="•"/>
             </a:pPr>
             <a:r>
-              <a:rPr lang="en-US" sz="1800" b="0" i="0" dirty="0">
+              <a:rPr lang="en-US" b="0" i="0" dirty="0">
                 <a:effectLst/>
                 <a:latin typeface="Söhne"/>
               </a:rPr>
@@ -11377,11 +11437,130 @@
               <a:buChar char="•"/>
             </a:pPr>
             <a:r>
-              <a:rPr lang="en-US" sz="1800" b="0" i="0" dirty="0">
-                <a:effectLst/>
-                <a:latin typeface="Söhne"/>
-              </a:rPr>
-              <a:t>Objective: To assist visitors in finding the appropriate medical doctor based on their biodata and medical records.</a:t>
+              <a:rPr lang="en-US" b="0" i="0" dirty="0">
+                <a:effectLst/>
+                <a:latin typeface="Söhne"/>
+              </a:rPr>
+              <a:t>Objective: To assist visitor </a:t>
+            </a:r>
+            <a:r>
+              <a:rPr lang="en-US" altLang="zh-CN" b="0" i="0" dirty="0">
+                <a:effectLst/>
+                <a:latin typeface="Söhne"/>
+              </a:rPr>
+              <a:t>to</a:t>
+            </a:r>
+            <a:r>
+              <a:rPr lang="en-US" b="0" i="0" dirty="0">
+                <a:effectLst/>
+                <a:latin typeface="Söhne"/>
+              </a:rPr>
+              <a:t> find the appropriate medical doctor based on </a:t>
+            </a:r>
+            <a:r>
+              <a:rPr lang="en-US" altLang="zh-CN" b="0" i="0" dirty="0">
+                <a:effectLst/>
+                <a:latin typeface="Söhne"/>
+              </a:rPr>
+              <a:t>the</a:t>
+            </a:r>
+            <a:r>
+              <a:rPr lang="zh-CN" altLang="en-US" b="0" i="0" dirty="0">
+                <a:effectLst/>
+                <a:latin typeface="Söhne"/>
+              </a:rPr>
+              <a:t> </a:t>
+            </a:r>
+            <a:r>
+              <a:rPr lang="en-US" altLang="zh-CN" b="0" i="0" dirty="0">
+                <a:effectLst/>
+                <a:latin typeface="Söhne"/>
+              </a:rPr>
+              <a:t>one’s</a:t>
+            </a:r>
+            <a:r>
+              <a:rPr lang="en-US" b="0" i="0" dirty="0">
+                <a:effectLst/>
+                <a:latin typeface="Söhne"/>
+              </a:rPr>
+              <a:t> biodata</a:t>
+            </a:r>
+            <a:r>
+              <a:rPr lang="en-US" altLang="zh-CN" b="0" i="0" dirty="0">
+                <a:effectLst/>
+                <a:latin typeface="Söhne"/>
+              </a:rPr>
+              <a:t>,</a:t>
+            </a:r>
+            <a:r>
+              <a:rPr lang="zh-CN" altLang="en-US" b="0" i="0" dirty="0">
+                <a:effectLst/>
+                <a:latin typeface="Söhne"/>
+              </a:rPr>
+              <a:t> </a:t>
+            </a:r>
+            <a:r>
+              <a:rPr lang="en-US" b="0" i="0" dirty="0">
+                <a:effectLst/>
+                <a:latin typeface="Söhne"/>
+              </a:rPr>
+              <a:t>medical records</a:t>
+            </a:r>
+            <a:r>
+              <a:rPr lang="en-US" altLang="zh-CN" b="0" i="0" dirty="0">
+                <a:effectLst/>
+                <a:latin typeface="Söhne"/>
+              </a:rPr>
+              <a:t>,</a:t>
+            </a:r>
+            <a:r>
+              <a:rPr lang="zh-CN" altLang="en-US" b="0" i="0" dirty="0">
+                <a:effectLst/>
+                <a:latin typeface="Söhne"/>
+              </a:rPr>
+              <a:t> </a:t>
+            </a:r>
+            <a:r>
+              <a:rPr lang="en-US" altLang="zh-CN" b="0" i="0" dirty="0">
+                <a:effectLst/>
+                <a:latin typeface="Söhne"/>
+              </a:rPr>
+              <a:t>symptoms,</a:t>
+            </a:r>
+            <a:r>
+              <a:rPr lang="zh-CN" altLang="en-US" b="0" i="0" dirty="0">
+                <a:effectLst/>
+                <a:latin typeface="Söhne"/>
+              </a:rPr>
+              <a:t> </a:t>
+            </a:r>
+            <a:r>
+              <a:rPr lang="en-US" altLang="zh-CN" b="0" i="0" dirty="0">
+                <a:effectLst/>
+                <a:latin typeface="Söhne"/>
+              </a:rPr>
+              <a:t>and</a:t>
+            </a:r>
+            <a:r>
+              <a:rPr lang="zh-CN" altLang="en-US" b="0" i="0" dirty="0">
+                <a:effectLst/>
+                <a:latin typeface="Söhne"/>
+              </a:rPr>
+              <a:t> </a:t>
+            </a:r>
+            <a:r>
+              <a:rPr lang="en-US" altLang="zh-CN" b="0" i="0" dirty="0">
+                <a:effectLst/>
+                <a:latin typeface="Söhne"/>
+              </a:rPr>
+              <a:t>preference</a:t>
+            </a:r>
+            <a:r>
+              <a:rPr lang="en-US" b="0" i="0" dirty="0">
+                <a:effectLst/>
+                <a:latin typeface="Söhne"/>
+              </a:rPr>
+              <a:t>.</a:t>
             </a:r>
           </a:p>
           <a:p>
@@ -11389,20 +11568,20 @@
               <a:buNone/>
             </a:pPr>
             <a:r>
-              <a:rPr lang="en-US" sz="1800" b="0" i="0" dirty="0">
+              <a:rPr lang="en-US" b="0" i="0" dirty="0">
                 <a:effectLst/>
                 <a:latin typeface="Söhne"/>
               </a:rPr>
               <a:t>Features:</a:t>
             </a:r>
             <a:r>
-              <a:rPr lang="zh-CN" altLang="en-US" sz="1800" b="0" i="0" dirty="0">
+              <a:rPr lang="zh-CN" altLang="en-US" b="0" i="0" dirty="0">
                 <a:effectLst/>
                 <a:latin typeface="Söhne"/>
               </a:rPr>
               <a:t> </a:t>
             </a:r>
-            <a:endParaRPr lang="en-US" altLang="zh-CN" sz="1800" b="0" i="0" dirty="0">
+            <a:endParaRPr lang="en-US" altLang="zh-CN" b="0" i="0" dirty="0">
               <a:effectLst/>
               <a:latin typeface="Söhne"/>
             </a:endParaRPr>
@@ -11413,85 +11592,83 @@
               <a:buAutoNum type="arabicPeriod"/>
             </a:pPr>
             <a:r>
-              <a:rPr lang="en-US" sz="1800" b="0" i="0" dirty="0">
+              <a:rPr lang="en-US" b="0" i="0" dirty="0">
                 <a:effectLst/>
                 <a:latin typeface="Söhne"/>
               </a:rPr>
               <a:t>Visitor‘s biodata consideration (gender, age, </a:t>
             </a:r>
             <a:r>
-              <a:rPr lang="en-US" altLang="zh-CN" sz="1800" b="0" i="0" dirty="0">
+              <a:rPr lang="en-US" altLang="zh-CN" b="0" i="0" dirty="0">
                 <a:effectLst/>
                 <a:latin typeface="Söhne"/>
               </a:rPr>
               <a:t>and </a:t>
             </a:r>
             <a:r>
-              <a:rPr lang="en-US" sz="1800" b="0" i="0" dirty="0">
+              <a:rPr lang="en-US" b="0" i="0" dirty="0">
                 <a:effectLst/>
                 <a:latin typeface="Söhne"/>
               </a:rPr>
               <a:t>smoking status</a:t>
             </a:r>
             <a:r>
-              <a:rPr lang="en-US" altLang="zh-CN" sz="1800" b="0" i="0" dirty="0">
+              <a:rPr lang="en-US" altLang="zh-CN" b="0" i="0" dirty="0">
                 <a:effectLst/>
                 <a:latin typeface="Söhne"/>
               </a:rPr>
               <a:t>,</a:t>
             </a:r>
             <a:r>
-              <a:rPr lang="zh-CN" altLang="en-US" sz="1800" b="0" i="0" dirty="0">
+              <a:rPr lang="zh-CN" altLang="en-US" b="0" i="0" dirty="0">
                 <a:effectLst/>
                 <a:latin typeface="Söhne"/>
               </a:rPr>
               <a:t> </a:t>
             </a:r>
             <a:r>
-              <a:rPr lang="en-US" altLang="zh-CN" sz="1800" b="0" i="0" dirty="0">
+              <a:rPr lang="en-US" altLang="zh-CN" b="0" i="0" dirty="0">
                 <a:effectLst/>
                 <a:latin typeface="Söhne"/>
               </a:rPr>
               <a:t>MD</a:t>
             </a:r>
             <a:r>
-              <a:rPr lang="zh-CN" altLang="en-US" sz="1800" b="0" i="0" dirty="0">
+              <a:rPr lang="zh-CN" altLang="en-US" b="0" i="0" dirty="0">
                 <a:effectLst/>
                 <a:latin typeface="Söhne"/>
               </a:rPr>
               <a:t> </a:t>
             </a:r>
             <a:r>
-              <a:rPr lang="en-US" altLang="zh-CN" sz="1800" b="0" i="0" dirty="0">
-                <a:effectLst/>
-                <a:latin typeface="Söhne"/>
-              </a:rPr>
-              <a:t>records</a:t>
-            </a:r>
-            <a:r>
-              <a:rPr lang="en-US" altLang="zh-CN" sz="1800" dirty="0">
-                <a:latin typeface="Söhne"/>
-              </a:rPr>
-              <a:t>,</a:t>
-            </a:r>
-            <a:r>
-              <a:rPr lang="zh-CN" altLang="en-US" sz="1800" dirty="0">
+              <a:rPr lang="en-US" altLang="zh-CN" dirty="0">
+                <a:latin typeface="Söhne"/>
+              </a:rPr>
+              <a:t>records,</a:t>
+            </a:r>
+            <a:r>
+              <a:rPr lang="zh-CN" altLang="en-US" dirty="0">
                 <a:latin typeface="Söhne"/>
               </a:rPr>
               <a:t> </a:t>
             </a:r>
             <a:r>
-              <a:rPr lang="en-US" altLang="zh-CN" sz="1800" dirty="0" err="1">
-                <a:latin typeface="Söhne"/>
-              </a:rPr>
-              <a:t>etc</a:t>
-            </a:r>
-            <a:r>
-              <a:rPr lang="en-US" sz="1800" b="0" i="0" dirty="0">
-                <a:effectLst/>
-                <a:latin typeface="Söhne"/>
-              </a:rPr>
-              <a:t>).</a:t>
+              <a:rPr lang="en-US" dirty="0">
+                <a:latin typeface="Söhne"/>
+              </a:rPr>
+              <a:t>et cetera</a:t>
+            </a:r>
+            <a:r>
+              <a:rPr lang="en-US" altLang="zh-CN" dirty="0">
+                <a:latin typeface="Söhne"/>
+              </a:rPr>
+              <a:t>.</a:t>
+            </a:r>
+            <a:r>
+              <a:rPr lang="en-US" dirty="0">
+                <a:latin typeface="Söhne"/>
+              </a:rPr>
+              <a:t>)</a:t>
             </a:r>
           </a:p>
           <a:p>
@@ -11500,26 +11677,58 @@
               <a:buAutoNum type="arabicPeriod"/>
             </a:pPr>
             <a:r>
-              <a:rPr lang="zh-CN" altLang="en-US" sz="1800" b="0" i="0" dirty="0">
+              <a:rPr lang="zh-CN" altLang="en-US" b="0" i="0" dirty="0">
                 <a:effectLst/>
                 <a:latin typeface="Söhne"/>
               </a:rPr>
               <a:t> </a:t>
             </a:r>
             <a:r>
-              <a:rPr lang="en-US" sz="1800" b="0" i="0" dirty="0">
-                <a:effectLst/>
-                <a:latin typeface="Söhne"/>
-              </a:rPr>
-              <a:t>Multiple turns conversation to </a:t>
-            </a:r>
-            <a:r>
-              <a:rPr lang="en-US" sz="1800" dirty="0">
-                <a:latin typeface="Söhne"/>
-              </a:rPr>
-              <a:t>collect visitor’s symptom interactively; </a:t>
-            </a:r>
-            <a:endParaRPr lang="en-US" sz="1800" b="0" i="0" dirty="0">
+              <a:rPr lang="en-US" b="0" i="0" dirty="0">
+                <a:effectLst/>
+                <a:latin typeface="Söhne"/>
+              </a:rPr>
+              <a:t>Multiple turns conversation to</a:t>
+            </a:r>
+            <a:r>
+              <a:rPr lang="zh-CN" altLang="en-US" b="0" i="0" dirty="0">
+                <a:effectLst/>
+                <a:latin typeface="Söhne"/>
+              </a:rPr>
+              <a:t> </a:t>
+            </a:r>
+            <a:r>
+              <a:rPr lang="en-US" dirty="0">
+                <a:latin typeface="Söhne"/>
+              </a:rPr>
+              <a:t>interactively</a:t>
+            </a:r>
+            <a:r>
+              <a:rPr lang="en-US" b="0" i="0" dirty="0">
+                <a:effectLst/>
+                <a:latin typeface="Söhne"/>
+              </a:rPr>
+              <a:t> </a:t>
+            </a:r>
+            <a:r>
+              <a:rPr lang="en-US" dirty="0">
+                <a:latin typeface="Söhne"/>
+              </a:rPr>
+              <a:t>collect visitor’s symptom</a:t>
+            </a:r>
+            <a:r>
+              <a:rPr lang="en-US" altLang="zh-CN" dirty="0">
+                <a:latin typeface="Söhne"/>
+              </a:rPr>
+              <a:t>s</a:t>
+            </a:r>
+            <a:r>
+              <a:rPr lang="en-US" dirty="0">
+                <a:latin typeface="Söhne"/>
+              </a:rPr>
+              <a:t>; </a:t>
+            </a:r>
+            <a:endParaRPr lang="en-US" b="0" i="0" dirty="0">
               <a:effectLst/>
               <a:latin typeface="Söhne"/>
             </a:endParaRPr>
@@ -11530,153 +11739,153 @@
               <a:buAutoNum type="arabicPeriod"/>
             </a:pPr>
             <a:r>
-              <a:rPr lang="zh-CN" altLang="en-US" sz="1800" b="0" i="0" dirty="0">
+              <a:rPr lang="zh-CN" altLang="en-US" b="0" i="0" dirty="0">
                 <a:effectLst/>
                 <a:latin typeface="Söhne"/>
               </a:rPr>
               <a:t> </a:t>
             </a:r>
             <a:r>
-              <a:rPr lang="en-US" altLang="zh-CN" sz="1800" b="0" i="0" dirty="0">
+              <a:rPr lang="en-US" altLang="zh-CN" b="0" i="0" dirty="0">
                 <a:effectLst/>
                 <a:latin typeface="Söhne"/>
               </a:rPr>
               <a:t>Decide</a:t>
             </a:r>
             <a:r>
-              <a:rPr lang="zh-CN" altLang="en-US" sz="1800" b="0" i="0" dirty="0">
+              <a:rPr lang="zh-CN" altLang="en-US" b="0" i="0" dirty="0">
                 <a:effectLst/>
                 <a:latin typeface="Söhne"/>
               </a:rPr>
               <a:t> </a:t>
             </a:r>
             <a:r>
-              <a:rPr lang="en-US" altLang="zh-CN" sz="1800" b="0" i="0" dirty="0">
+              <a:rPr lang="en-US" altLang="zh-CN" b="0" i="0" dirty="0">
                 <a:effectLst/>
                 <a:latin typeface="Söhne"/>
               </a:rPr>
               <a:t>MD</a:t>
             </a:r>
             <a:r>
-              <a:rPr lang="zh-CN" altLang="en-US" sz="1800" b="0" i="0" dirty="0">
+              <a:rPr lang="zh-CN" altLang="en-US" b="0" i="0" dirty="0">
                 <a:effectLst/>
                 <a:latin typeface="Söhne"/>
               </a:rPr>
               <a:t> </a:t>
             </a:r>
             <a:r>
-              <a:rPr lang="en-US" altLang="zh-CN" sz="1800" b="0" i="0" dirty="0">
+              <a:rPr lang="en-US" altLang="zh-CN" b="0" i="0" dirty="0">
                 <a:effectLst/>
                 <a:latin typeface="Söhne"/>
               </a:rPr>
               <a:t>category,</a:t>
             </a:r>
             <a:r>
-              <a:rPr lang="zh-CN" altLang="en-US" sz="1800" b="0" i="0" dirty="0">
+              <a:rPr lang="zh-CN" altLang="en-US" b="0" i="0" dirty="0">
                 <a:effectLst/>
                 <a:latin typeface="Söhne"/>
               </a:rPr>
               <a:t> </a:t>
             </a:r>
             <a:r>
-              <a:rPr lang="en-US" altLang="zh-CN" sz="1800" b="0" i="0" dirty="0">
+              <a:rPr lang="en-US" altLang="zh-CN" b="0" i="0" dirty="0">
                 <a:effectLst/>
                 <a:latin typeface="Söhne"/>
               </a:rPr>
               <a:t>and</a:t>
             </a:r>
             <a:r>
-              <a:rPr lang="zh-CN" altLang="en-US" sz="1800" b="0" i="0" dirty="0">
+              <a:rPr lang="zh-CN" altLang="en-US" b="0" i="0" dirty="0">
                 <a:effectLst/>
                 <a:latin typeface="Söhne"/>
               </a:rPr>
               <a:t> </a:t>
             </a:r>
             <a:r>
-              <a:rPr lang="en-US" altLang="zh-CN" sz="1800" b="0" i="0" dirty="0">
+              <a:rPr lang="en-US" altLang="zh-CN" b="0" i="0" dirty="0">
                 <a:effectLst/>
                 <a:latin typeface="Söhne"/>
               </a:rPr>
               <a:t>provide</a:t>
             </a:r>
             <a:r>
-              <a:rPr lang="zh-CN" altLang="en-US" sz="1800" b="0" i="0" dirty="0">
+              <a:rPr lang="zh-CN" altLang="en-US" b="0" i="0" dirty="0">
                 <a:effectLst/>
                 <a:latin typeface="Söhne"/>
               </a:rPr>
               <a:t> </a:t>
             </a:r>
             <a:r>
-              <a:rPr lang="en-US" altLang="zh-CN" sz="1800" b="0" i="0" dirty="0">
+              <a:rPr lang="en-US" altLang="zh-CN" b="0" i="0" dirty="0">
                 <a:effectLst/>
                 <a:latin typeface="Söhne"/>
               </a:rPr>
               <a:t>the</a:t>
             </a:r>
             <a:r>
-              <a:rPr lang="zh-CN" altLang="en-US" sz="1800" b="0" i="0" dirty="0">
+              <a:rPr lang="zh-CN" altLang="en-US" b="0" i="0" dirty="0">
                 <a:effectLst/>
                 <a:latin typeface="Söhne"/>
               </a:rPr>
               <a:t> </a:t>
             </a:r>
             <a:r>
-              <a:rPr lang="en-US" altLang="zh-CN" sz="1800" b="0" i="0" dirty="0">
+              <a:rPr lang="en-US" altLang="zh-CN" b="0" i="0" dirty="0">
                 <a:effectLst/>
                 <a:latin typeface="Söhne"/>
               </a:rPr>
               <a:t>explanation</a:t>
             </a:r>
             <a:r>
-              <a:rPr lang="zh-CN" altLang="en-US" sz="1800" b="0" i="0" dirty="0">
+              <a:rPr lang="zh-CN" altLang="en-US" b="0" i="0" dirty="0">
                 <a:effectLst/>
                 <a:latin typeface="Söhne"/>
               </a:rPr>
               <a:t> </a:t>
             </a:r>
             <a:r>
-              <a:rPr lang="en-US" altLang="zh-CN" sz="1800" b="0" i="0" dirty="0">
+              <a:rPr lang="en-US" altLang="zh-CN" b="0" i="0" dirty="0">
                 <a:effectLst/>
                 <a:latin typeface="Söhne"/>
               </a:rPr>
               <a:t>of</a:t>
             </a:r>
             <a:r>
-              <a:rPr lang="zh-CN" altLang="en-US" sz="1800" b="0" i="0" dirty="0">
+              <a:rPr lang="zh-CN" altLang="en-US" b="0" i="0" dirty="0">
                 <a:effectLst/>
                 <a:latin typeface="Söhne"/>
               </a:rPr>
               <a:t> </a:t>
             </a:r>
             <a:r>
-              <a:rPr lang="en-US" altLang="zh-CN" sz="1800" b="0" i="0" dirty="0">
+              <a:rPr lang="en-US" altLang="zh-CN" b="0" i="0" dirty="0">
                 <a:effectLst/>
                 <a:latin typeface="Söhne"/>
               </a:rPr>
               <a:t>the</a:t>
             </a:r>
             <a:r>
-              <a:rPr lang="zh-CN" altLang="en-US" sz="1800" b="0" i="0" dirty="0">
+              <a:rPr lang="zh-CN" altLang="en-US" b="0" i="0" dirty="0">
                 <a:effectLst/>
                 <a:latin typeface="Söhne"/>
               </a:rPr>
               <a:t> </a:t>
             </a:r>
             <a:r>
-              <a:rPr lang="en-US" altLang="zh-CN" sz="1800" b="0" i="0" dirty="0">
+              <a:rPr lang="en-US" altLang="zh-CN" b="0" i="0" dirty="0">
                 <a:effectLst/>
                 <a:latin typeface="Söhne"/>
               </a:rPr>
               <a:t>decision;</a:t>
             </a:r>
             <a:r>
-              <a:rPr lang="zh-CN" altLang="en-US" sz="1800" b="0" i="0" dirty="0">
+              <a:rPr lang="zh-CN" altLang="en-US" b="0" i="0" dirty="0">
                 <a:effectLst/>
                 <a:latin typeface="Söhne"/>
               </a:rPr>
               <a:t> </a:t>
             </a:r>
-            <a:endParaRPr lang="en-US" sz="1800" b="0" i="0" dirty="0">
+            <a:endParaRPr lang="en-US" b="0" i="0" dirty="0">
               <a:effectLst/>
               <a:latin typeface="Söhne"/>
             </a:endParaRPr>
@@ -11687,58 +11896,94 @@
               <a:buAutoNum type="arabicPeriod"/>
             </a:pPr>
             <a:r>
-              <a:rPr lang="zh-CN" altLang="en-US" sz="1800" b="0" i="0" dirty="0">
+              <a:rPr lang="zh-CN" altLang="en-US" b="0" i="0" dirty="0">
                 <a:effectLst/>
                 <a:latin typeface="Söhne"/>
               </a:rPr>
               <a:t> </a:t>
             </a:r>
             <a:r>
-              <a:rPr lang="en-US" sz="1800" b="0" i="0" dirty="0">
+              <a:rPr lang="en-US" b="0" i="0" dirty="0">
                 <a:effectLst/>
                 <a:latin typeface="Söhne"/>
               </a:rPr>
               <a:t>Appointment scheduling and confirmation capabilities</a:t>
             </a:r>
             <a:r>
-              <a:rPr lang="zh-CN" altLang="en-US" sz="1800" b="0" i="0" dirty="0">
+              <a:rPr lang="zh-CN" altLang="en-US" b="0" i="0" dirty="0">
                 <a:effectLst/>
                 <a:latin typeface="Söhne"/>
               </a:rPr>
               <a:t> </a:t>
             </a:r>
             <a:r>
-              <a:rPr lang="en-US" altLang="zh-CN" sz="1800" dirty="0">
+              <a:rPr lang="en-US" altLang="zh-CN" dirty="0">
                 <a:latin typeface="Söhne"/>
               </a:rPr>
               <a:t>given</a:t>
             </a:r>
             <a:r>
-              <a:rPr lang="zh-CN" altLang="en-US" sz="1800" dirty="0">
+              <a:rPr lang="zh-CN" altLang="en-US" dirty="0">
                 <a:latin typeface="Söhne"/>
               </a:rPr>
               <a:t> </a:t>
             </a:r>
             <a:r>
-              <a:rPr lang="en-US" altLang="zh-CN" sz="1800" dirty="0" err="1">
-                <a:latin typeface="Söhne"/>
-              </a:rPr>
-              <a:t>vistor’s</a:t>
-            </a:r>
-            <a:r>
-              <a:rPr lang="zh-CN" altLang="en-US" sz="1800" dirty="0">
+              <a:rPr lang="en-US" altLang="zh-CN" dirty="0">
+                <a:latin typeface="Söhne"/>
+              </a:rPr>
+              <a:t>visitor‘s</a:t>
+            </a:r>
+            <a:r>
+              <a:rPr lang="zh-CN" altLang="en-US" dirty="0">
                 <a:latin typeface="Söhne"/>
               </a:rPr>
               <a:t> </a:t>
             </a:r>
             <a:r>
-              <a:rPr lang="en-US" altLang="zh-CN" sz="1800" dirty="0">
+              <a:rPr lang="en-US" altLang="zh-CN" dirty="0">
                 <a:latin typeface="Söhne"/>
               </a:rPr>
               <a:t>preference</a:t>
             </a:r>
             <a:r>
-              <a:rPr lang="en-US" sz="1800" b="0" i="0" dirty="0">
+              <a:rPr lang="zh-CN" altLang="en-US" dirty="0">
+                <a:latin typeface="Söhne"/>
+              </a:rPr>
+              <a:t> </a:t>
+            </a:r>
+            <a:r>
+              <a:rPr lang="en-US" altLang="zh-CN" dirty="0">
+                <a:latin typeface="Söhne"/>
+              </a:rPr>
+              <a:t>(address</a:t>
+            </a:r>
+            <a:r>
+              <a:rPr lang="zh-CN" altLang="en-US" dirty="0">
+                <a:latin typeface="Söhne"/>
+              </a:rPr>
+              <a:t> </a:t>
+            </a:r>
+            <a:r>
+              <a:rPr lang="en-US" altLang="zh-CN" dirty="0">
+                <a:latin typeface="Söhne"/>
+              </a:rPr>
+              <a:t>and</a:t>
+            </a:r>
+            <a:r>
+              <a:rPr lang="zh-CN" altLang="en-US" dirty="0">
+                <a:latin typeface="Söhne"/>
+              </a:rPr>
+              <a:t> </a:t>
+            </a:r>
+            <a:r>
+              <a:rPr lang="en-US" altLang="zh-CN" dirty="0">
+                <a:latin typeface="Söhne"/>
+              </a:rPr>
+              <a:t>time)</a:t>
+            </a:r>
+            <a:r>
+              <a:rPr lang="en-US" b="0" i="0" dirty="0">
                 <a:effectLst/>
                 <a:latin typeface="Söhne"/>
               </a:rPr>
@@ -13916,7 +14161,12 @@
             <p:ph type="title"/>
           </p:nvPr>
         </p:nvSpPr>
-        <p:spPr/>
+        <p:spPr>
+          <a:xfrm>
+            <a:off x="593752" y="141861"/>
+            <a:ext cx="10058400" cy="1609344"/>
+          </a:xfrm>
+        </p:spPr>
         <p:txBody>
           <a:bodyPr/>
           <a:lstStyle/>
@@ -14023,8 +14273,8 @@
         </p:nvSpPr>
         <p:spPr>
           <a:xfrm>
-            <a:off x="4305140" y="3376799"/>
-            <a:ext cx="1757082" cy="630936"/>
+            <a:off x="4305139" y="3376799"/>
+            <a:ext cx="2022575" cy="630936"/>
           </a:xfrm>
           <a:prstGeom prst="diamond">
             <a:avLst/>

</xml_diff>